<commit_message>
added class 2 work
</commit_message>
<xml_diff>
--- a/slides/02_getting_data.pptx
+++ b/slides/02_getting_data.pptx
@@ -6,7 +6,7 @@
     <p:sldMasterId id="2147483649" r:id="rId2"/>
   </p:sldMasterIdLst>
   <p:notesMasterIdLst>
-    <p:notesMasterId r:id="rId28"/>
+    <p:notesMasterId r:id="rId29"/>
   </p:notesMasterIdLst>
   <p:sldIdLst>
     <p:sldId id="258" r:id="rId3"/>
@@ -15,25 +15,26 @@
     <p:sldId id="394" r:id="rId6"/>
     <p:sldId id="432" r:id="rId7"/>
     <p:sldId id="433" r:id="rId8"/>
-    <p:sldId id="440" r:id="rId9"/>
-    <p:sldId id="434" r:id="rId10"/>
-    <p:sldId id="435" r:id="rId11"/>
-    <p:sldId id="429" r:id="rId12"/>
+    <p:sldId id="434" r:id="rId9"/>
+    <p:sldId id="435" r:id="rId10"/>
+    <p:sldId id="429" r:id="rId11"/>
+    <p:sldId id="440" r:id="rId12"/>
     <p:sldId id="386" r:id="rId13"/>
     <p:sldId id="388" r:id="rId14"/>
     <p:sldId id="421" r:id="rId15"/>
     <p:sldId id="422" r:id="rId16"/>
-    <p:sldId id="427" r:id="rId17"/>
-    <p:sldId id="428" r:id="rId18"/>
-    <p:sldId id="328" r:id="rId19"/>
-    <p:sldId id="430" r:id="rId20"/>
-    <p:sldId id="423" r:id="rId21"/>
-    <p:sldId id="424" r:id="rId22"/>
-    <p:sldId id="426" r:id="rId23"/>
-    <p:sldId id="425" r:id="rId24"/>
-    <p:sldId id="437" r:id="rId25"/>
-    <p:sldId id="438" r:id="rId26"/>
-    <p:sldId id="439" r:id="rId27"/>
+    <p:sldId id="441" r:id="rId17"/>
+    <p:sldId id="427" r:id="rId18"/>
+    <p:sldId id="428" r:id="rId19"/>
+    <p:sldId id="328" r:id="rId20"/>
+    <p:sldId id="430" r:id="rId21"/>
+    <p:sldId id="423" r:id="rId22"/>
+    <p:sldId id="424" r:id="rId23"/>
+    <p:sldId id="426" r:id="rId24"/>
+    <p:sldId id="425" r:id="rId25"/>
+    <p:sldId id="437" r:id="rId26"/>
+    <p:sldId id="438" r:id="rId27"/>
+    <p:sldId id="439" r:id="rId28"/>
   </p:sldIdLst>
   <p:sldSz cx="9363075" cy="5257800"/>
   <p:notesSz cx="6858000" cy="9144000"/>
@@ -887,7 +888,7 @@
           <a:p>
             <a:fld id="{ADD4B5B7-85EF-4E48-AC80-2380FACD9C23}" type="slidenum">
               <a:rPr lang="en-US" smtClean="0"/>
-              <a:t>17</a:t>
+              <a:t>18</a:t>
             </a:fld>
             <a:endParaRPr lang="en-US"/>
           </a:p>
@@ -984,7 +985,7 @@
           <a:p>
             <a:fld id="{ADD4B5B7-85EF-4E48-AC80-2380FACD9C23}" type="slidenum">
               <a:rPr lang="en-US" smtClean="0"/>
-              <a:t>23</a:t>
+              <a:t>24</a:t>
             </a:fld>
             <a:endParaRPr lang="en-US"/>
           </a:p>
@@ -1516,7 +1517,7 @@
           <a:p>
             <a:fld id="{ADD4B5B7-85EF-4E48-AC80-2380FACD9C23}" type="slidenum">
               <a:rPr lang="en-US" smtClean="0"/>
-              <a:t>8</a:t>
+              <a:t>7</a:t>
             </a:fld>
             <a:endParaRPr lang="en-US"/>
           </a:p>
@@ -1604,7 +1605,7 @@
           <a:p>
             <a:fld id="{ADD4B5B7-85EF-4E48-AC80-2380FACD9C23}" type="slidenum">
               <a:rPr lang="en-US" smtClean="0"/>
-              <a:t>9</a:t>
+              <a:t>8</a:t>
             </a:fld>
             <a:endParaRPr lang="en-US"/>
           </a:p>
@@ -1692,7 +1693,7 @@
           <a:p>
             <a:fld id="{ADD4B5B7-85EF-4E48-AC80-2380FACD9C23}" type="slidenum">
               <a:rPr lang="en-US" smtClean="0"/>
-              <a:t>10</a:t>
+              <a:t>9</a:t>
             </a:fld>
             <a:endParaRPr lang="en-US"/>
           </a:p>
@@ -8708,12 +8709,45 @@
             <p:ph type="title"/>
           </p:nvPr>
         </p:nvSpPr>
-        <p:spPr>
-          <a:xfrm>
-            <a:off x="347663" y="3924300"/>
-            <a:ext cx="8426450" cy="1143000"/>
-          </a:xfrm>
-        </p:spPr>
+        <p:spPr/>
+        <p:txBody>
+          <a:bodyPr/>
+          <a:lstStyle/>
+          <a:p>
+            <a:endParaRPr lang="en-US" dirty="0"/>
+          </a:p>
+        </p:txBody>
+      </p:sp>
+      <p:sp>
+        <p:nvSpPr>
+          <p:cNvPr id="3" name="Content Placeholder 2"/>
+          <p:cNvSpPr>
+            <a:spLocks noGrp="1"/>
+          </p:cNvSpPr>
+          <p:nvPr>
+            <p:ph idx="1"/>
+          </p:nvPr>
+        </p:nvSpPr>
+        <p:spPr/>
+        <p:txBody>
+          <a:bodyPr/>
+          <a:lstStyle/>
+          <a:p>
+            <a:endParaRPr lang="en-US"/>
+          </a:p>
+        </p:txBody>
+      </p:sp>
+      <p:sp>
+        <p:nvSpPr>
+          <p:cNvPr id="5" name="Slide Number Placeholder 4"/>
+          <p:cNvSpPr>
+            <a:spLocks noGrp="1"/>
+          </p:cNvSpPr>
+          <p:nvPr>
+            <p:ph type="sldNum" sz="quarter" idx="12"/>
+          </p:nvPr>
+        </p:nvSpPr>
+        <p:spPr/>
         <p:txBody>
           <a:bodyPr/>
           <a:lstStyle/>
@@ -8721,59 +8755,45 @@
             <a:pPr>
               <a:defRPr/>
             </a:pPr>
-            <a:r>
-              <a:rPr lang="en-US" sz="6600" dirty="0" smtClean="0"/>
-              <a:t>ii. REGEX / Requests</a:t>
-            </a:r>
-            <a:endParaRPr lang="en-US" sz="6600" dirty="0"/>
-          </a:p>
-        </p:txBody>
-      </p:sp>
-      <p:sp>
-        <p:nvSpPr>
-          <p:cNvPr id="4" name="Content Placeholder 3"/>
-          <p:cNvSpPr>
-            <a:spLocks noGrp="1"/>
-          </p:cNvSpPr>
-          <p:nvPr>
-            <p:ph sz="quarter" idx="11"/>
-          </p:nvPr>
-        </p:nvSpPr>
+            <a:fld id="{7D2F14C5-AF8B-6B42-A67C-58A084EA75B8}" type="slidenum">
+              <a:rPr lang="en-US" smtClean="0"/>
+              <a:pPr>
+                <a:defRPr/>
+              </a:pPr>
+              <a:t>10</a:t>
+            </a:fld>
+            <a:endParaRPr lang="en-US" dirty="0"/>
+          </a:p>
+        </p:txBody>
+      </p:sp>
+      <p:pic>
+        <p:nvPicPr>
+          <p:cNvPr id="6" name="Picture 5"/>
+          <p:cNvPicPr>
+            <a:picLocks noChangeAspect="1"/>
+          </p:cNvPicPr>
+          <p:nvPr/>
+        </p:nvPicPr>
+        <p:blipFill>
+          <a:blip r:embed="rId2"/>
+          <a:stretch>
+            <a:fillRect/>
+          </a:stretch>
+        </p:blipFill>
         <p:spPr>
           <a:xfrm>
-            <a:off x="371475" y="495300"/>
-            <a:ext cx="6400800" cy="304800"/>
-          </a:xfrm>
-        </p:spPr>
-        <p:txBody>
-          <a:bodyPr wrap="square" lIns="91440" tIns="45720" rIns="91440" bIns="45720" numCol="1" anchor="t" anchorCtr="0" compatLnSpc="1">
-            <a:prstTxWarp prst="textNoShape">
-              <a:avLst/>
-            </a:prstTxWarp>
-          </a:bodyPr>
-          <a:lstStyle/>
-          <a:p>
-            <a:pPr marL="0" indent="0"/>
-            <a:r>
-              <a:rPr lang="en-US" cap="none" dirty="0" smtClean="0">
-                <a:latin typeface="PFDinTextCompPro-Bold" charset="0"/>
-                <a:ea typeface="ヒラギノ角ゴ ProN W3" charset="0"/>
-                <a:cs typeface="ヒラギノ角ゴ ProN W3" charset="0"/>
-              </a:rPr>
-              <a:t>INTRO TO DATA SCIENCE</a:t>
-            </a:r>
-            <a:endParaRPr lang="en-US" cap="none" dirty="0">
-              <a:latin typeface="PFDinTextCompPro-Bold" charset="0"/>
-              <a:ea typeface="ヒラギノ角ゴ ProN W3" charset="0"/>
-              <a:cs typeface="ヒラギノ角ゴ ProN W3" charset="0"/>
-            </a:endParaRPr>
-          </a:p>
-        </p:txBody>
-      </p:sp>
+            <a:off x="2082800" y="0"/>
+            <a:ext cx="5197166" cy="5257800"/>
+          </a:xfrm>
+          <a:prstGeom prst="rect">
+            <a:avLst/>
+          </a:prstGeom>
+        </p:spPr>
+      </p:pic>
     </p:spTree>
     <p:extLst>
       <p:ext uri="{BB962C8B-B14F-4D97-AF65-F5344CB8AC3E}">
-        <p14:creationId xmlns:p14="http://schemas.microsoft.com/office/powerpoint/2010/main" val="3286295500"/>
+        <p14:creationId xmlns:p14="http://schemas.microsoft.com/office/powerpoint/2010/main" val="1133534824"/>
       </p:ext>
     </p:extLst>
   </p:cSld>
@@ -8781,13 +8801,6 @@
     <a:masterClrMapping/>
   </p:clrMapOvr>
   <p:transition xmlns:p14="http://schemas.microsoft.com/office/powerpoint/2010/main"/>
-  <p:timing>
-    <p:tnLst>
-      <p:par>
-        <p:cTn xmlns:p14="http://schemas.microsoft.com/office/powerpoint/2010/main" id="1" dur="indefinite" restart="never" nodeType="tmRoot"/>
-      </p:par>
-    </p:tnLst>
-  </p:timing>
 </p:sld>
 </file>
 
@@ -9756,8 +9769,8 @@
           <a:lstStyle/>
           <a:p>
             <a:r>
-              <a:rPr lang="en-US" dirty="0" smtClean="0"/>
-              <a:t>Web crawlers</a:t>
+              <a:rPr lang="en-US" dirty="0" err="1" smtClean="0"/>
+              <a:t>beautifulsoup</a:t>
             </a:r>
             <a:endParaRPr lang="en-US" dirty="0"/>
           </a:p>
@@ -9825,8 +9838,8 @@
         </p:nvSpPr>
         <p:spPr>
           <a:xfrm>
-            <a:off x="2515931" y="2476500"/>
-            <a:ext cx="4306287" cy="738664"/>
+            <a:off x="719137" y="3848100"/>
+            <a:ext cx="7828811" cy="738664"/>
           </a:xfrm>
           <a:prstGeom prst="rect">
             <a:avLst/>
@@ -9843,7 +9856,7 @@
                 <a:latin typeface="News706 BT"/>
                 <a:cs typeface="News706 BT"/>
               </a:rPr>
-              <a:t>We just built one!</a:t>
+              <a:t>Is a python based HTML parser.</a:t>
             </a:r>
             <a:endParaRPr lang="en-US" dirty="0">
               <a:latin typeface="News706 BT"/>
@@ -9852,10 +9865,40 @@
           </a:p>
         </p:txBody>
       </p:sp>
+      <p:sp>
+        <p:nvSpPr>
+          <p:cNvPr id="3" name="TextBox 2"/>
+          <p:cNvSpPr txBox="1"/>
+          <p:nvPr/>
+        </p:nvSpPr>
+        <p:spPr>
+          <a:xfrm>
+            <a:off x="6098310" y="4519136"/>
+            <a:ext cx="2160398" cy="630942"/>
+          </a:xfrm>
+          <a:prstGeom prst="rect">
+            <a:avLst/>
+          </a:prstGeom>
+          <a:noFill/>
+        </p:spPr>
+        <p:txBody>
+          <a:bodyPr wrap="none" rtlCol="0">
+            <a:spAutoFit/>
+          </a:bodyPr>
+          <a:lstStyle/>
+          <a:p>
+            <a:r>
+              <a:rPr lang="en-US" sz="3500" dirty="0" smtClean="0"/>
+              <a:t>Let’s try it!</a:t>
+            </a:r>
+            <a:endParaRPr lang="en-US" sz="3500" dirty="0"/>
+          </a:p>
+        </p:txBody>
+      </p:sp>
     </p:spTree>
     <p:extLst>
       <p:ext uri="{BB962C8B-B14F-4D97-AF65-F5344CB8AC3E}">
-        <p14:creationId xmlns:p14="http://schemas.microsoft.com/office/powerpoint/2010/main" val="1959997954"/>
+        <p14:creationId xmlns:p14="http://schemas.microsoft.com/office/powerpoint/2010/main" val="4171567825"/>
       </p:ext>
     </p:extLst>
   </p:cSld>
@@ -10000,97 +10043,10 @@
           </a:p>
         </p:txBody>
       </p:sp>
-      <p:sp>
-        <p:nvSpPr>
-          <p:cNvPr id="7" name="TextBox 6"/>
-          <p:cNvSpPr txBox="1"/>
-          <p:nvPr/>
-        </p:nvSpPr>
-        <p:spPr>
-          <a:xfrm>
-            <a:off x="146521" y="4914900"/>
-            <a:ext cx="4288353" cy="246221"/>
-          </a:xfrm>
-          <a:prstGeom prst="rect">
-            <a:avLst/>
-          </a:prstGeom>
-          <a:noFill/>
-        </p:spPr>
-        <p:txBody>
-          <a:bodyPr wrap="none" rtlCol="0">
-            <a:spAutoFit/>
-          </a:bodyPr>
-          <a:lstStyle/>
-          <a:p>
-            <a:r>
-              <a:rPr lang="en-US" sz="1000" dirty="0" smtClean="0"/>
-              <a:t>Hacking </a:t>
-            </a:r>
-            <a:r>
-              <a:rPr lang="en-US" sz="1000" dirty="0" err="1" smtClean="0"/>
-              <a:t>OKCupid</a:t>
-            </a:r>
-            <a:r>
-              <a:rPr lang="en-US" sz="1000" dirty="0" smtClean="0"/>
-              <a:t>:     </a:t>
-            </a:r>
-            <a:r>
-              <a:rPr lang="en-US" sz="1000" dirty="0"/>
-              <a:t>http://</a:t>
-            </a:r>
-            <a:r>
-              <a:rPr lang="en-US" sz="1000" dirty="0" err="1"/>
-              <a:t>www.wired.com</a:t>
-            </a:r>
-            <a:r>
-              <a:rPr lang="en-US" sz="1000" dirty="0"/>
-              <a:t>/2014/01/how-to-hack-</a:t>
-            </a:r>
-            <a:r>
-              <a:rPr lang="en-US" sz="1000" dirty="0" err="1"/>
-              <a:t>okcupid</a:t>
-            </a:r>
-            <a:r>
-              <a:rPr lang="en-US" sz="1000" dirty="0"/>
-              <a:t>/all/</a:t>
-            </a:r>
-          </a:p>
-        </p:txBody>
-      </p:sp>
-      <p:sp>
-        <p:nvSpPr>
-          <p:cNvPr id="3" name="TextBox 2"/>
-          <p:cNvSpPr txBox="1"/>
-          <p:nvPr/>
-        </p:nvSpPr>
-        <p:spPr>
-          <a:xfrm>
-            <a:off x="4529137" y="3543300"/>
-            <a:ext cx="3868141" cy="738664"/>
-          </a:xfrm>
-          <a:prstGeom prst="rect">
-            <a:avLst/>
-          </a:prstGeom>
-          <a:noFill/>
-        </p:spPr>
-        <p:txBody>
-          <a:bodyPr wrap="none" rtlCol="0">
-            <a:spAutoFit/>
-          </a:bodyPr>
-          <a:lstStyle/>
-          <a:p>
-            <a:r>
-              <a:rPr lang="en-US" dirty="0" smtClean="0"/>
-              <a:t>But be careful….</a:t>
-            </a:r>
-            <a:endParaRPr lang="en-US" dirty="0"/>
-          </a:p>
-        </p:txBody>
-      </p:sp>
     </p:spTree>
     <p:extLst>
       <p:ext uri="{BB962C8B-B14F-4D97-AF65-F5344CB8AC3E}">
-        <p14:creationId xmlns:p14="http://schemas.microsoft.com/office/powerpoint/2010/main" val="2938092286"/>
+        <p14:creationId xmlns:p14="http://schemas.microsoft.com/office/powerpoint/2010/main" val="1959997954"/>
       </p:ext>
     </p:extLst>
   </p:cSld>
@@ -10130,6 +10086,241 @@
         </p:nvSpPr>
         <p:spPr>
           <a:xfrm>
+            <a:off x="348398" y="1115943"/>
+            <a:ext cx="8425853" cy="1055757"/>
+          </a:xfrm>
+        </p:spPr>
+        <p:txBody>
+          <a:bodyPr/>
+          <a:lstStyle/>
+          <a:p>
+            <a:r>
+              <a:rPr lang="en-US" dirty="0" smtClean="0"/>
+              <a:t>Web crawlers</a:t>
+            </a:r>
+            <a:endParaRPr lang="en-US" dirty="0"/>
+          </a:p>
+        </p:txBody>
+      </p:sp>
+      <p:sp>
+        <p:nvSpPr>
+          <p:cNvPr id="4" name="Content Placeholder 3"/>
+          <p:cNvSpPr>
+            <a:spLocks noGrp="1"/>
+          </p:cNvSpPr>
+          <p:nvPr>
+            <p:ph sz="quarter" idx="11"/>
+          </p:nvPr>
+        </p:nvSpPr>
+        <p:spPr/>
+        <p:txBody>
+          <a:bodyPr/>
+          <a:lstStyle/>
+          <a:p>
+            <a:r>
+              <a:rPr lang="en-US" dirty="0"/>
+              <a:t>REGEX / Requests</a:t>
+            </a:r>
+          </a:p>
+          <a:p>
+            <a:endParaRPr lang="en-US" dirty="0"/>
+          </a:p>
+        </p:txBody>
+      </p:sp>
+      <p:sp>
+        <p:nvSpPr>
+          <p:cNvPr id="5" name="Slide Number Placeholder 4"/>
+          <p:cNvSpPr>
+            <a:spLocks noGrp="1"/>
+          </p:cNvSpPr>
+          <p:nvPr>
+            <p:ph type="sldNum" sz="quarter" idx="12"/>
+          </p:nvPr>
+        </p:nvSpPr>
+        <p:spPr/>
+        <p:txBody>
+          <a:bodyPr/>
+          <a:lstStyle/>
+          <a:p>
+            <a:pPr>
+              <a:defRPr/>
+            </a:pPr>
+            <a:fld id="{7D2F14C5-AF8B-6B42-A67C-58A084EA75B8}" type="slidenum">
+              <a:rPr lang="en-US" smtClean="0"/>
+              <a:pPr>
+                <a:defRPr/>
+              </a:pPr>
+              <a:t>17</a:t>
+            </a:fld>
+            <a:endParaRPr lang="en-US" dirty="0"/>
+          </a:p>
+        </p:txBody>
+      </p:sp>
+      <p:sp>
+        <p:nvSpPr>
+          <p:cNvPr id="6" name="Rectangle 5"/>
+          <p:cNvSpPr/>
+          <p:nvPr/>
+        </p:nvSpPr>
+        <p:spPr>
+          <a:xfrm>
+            <a:off x="2515931" y="2476500"/>
+            <a:ext cx="4306287" cy="738664"/>
+          </a:xfrm>
+          <a:prstGeom prst="rect">
+            <a:avLst/>
+          </a:prstGeom>
+        </p:spPr>
+        <p:txBody>
+          <a:bodyPr wrap="none">
+            <a:spAutoFit/>
+          </a:bodyPr>
+          <a:lstStyle/>
+          <a:p>
+            <a:r>
+              <a:rPr lang="en-US" dirty="0" smtClean="0">
+                <a:latin typeface="News706 BT"/>
+                <a:cs typeface="News706 BT"/>
+              </a:rPr>
+              <a:t>We just built one!</a:t>
+            </a:r>
+            <a:endParaRPr lang="en-US" dirty="0">
+              <a:latin typeface="News706 BT"/>
+              <a:cs typeface="News706 BT"/>
+            </a:endParaRPr>
+          </a:p>
+        </p:txBody>
+      </p:sp>
+      <p:sp>
+        <p:nvSpPr>
+          <p:cNvPr id="7" name="TextBox 6"/>
+          <p:cNvSpPr txBox="1"/>
+          <p:nvPr/>
+        </p:nvSpPr>
+        <p:spPr>
+          <a:xfrm>
+            <a:off x="146521" y="4914900"/>
+            <a:ext cx="4288353" cy="246221"/>
+          </a:xfrm>
+          <a:prstGeom prst="rect">
+            <a:avLst/>
+          </a:prstGeom>
+          <a:noFill/>
+        </p:spPr>
+        <p:txBody>
+          <a:bodyPr wrap="none" rtlCol="0">
+            <a:spAutoFit/>
+          </a:bodyPr>
+          <a:lstStyle/>
+          <a:p>
+            <a:r>
+              <a:rPr lang="en-US" sz="1000" dirty="0" smtClean="0"/>
+              <a:t>Hacking </a:t>
+            </a:r>
+            <a:r>
+              <a:rPr lang="en-US" sz="1000" dirty="0" err="1" smtClean="0"/>
+              <a:t>OKCupid</a:t>
+            </a:r>
+            <a:r>
+              <a:rPr lang="en-US" sz="1000" dirty="0" smtClean="0"/>
+              <a:t>:     </a:t>
+            </a:r>
+            <a:r>
+              <a:rPr lang="en-US" sz="1000" dirty="0"/>
+              <a:t>http://</a:t>
+            </a:r>
+            <a:r>
+              <a:rPr lang="en-US" sz="1000" dirty="0" err="1"/>
+              <a:t>www.wired.com</a:t>
+            </a:r>
+            <a:r>
+              <a:rPr lang="en-US" sz="1000" dirty="0"/>
+              <a:t>/2014/01/how-to-hack-</a:t>
+            </a:r>
+            <a:r>
+              <a:rPr lang="en-US" sz="1000" dirty="0" err="1"/>
+              <a:t>okcupid</a:t>
+            </a:r>
+            <a:r>
+              <a:rPr lang="en-US" sz="1000" dirty="0"/>
+              <a:t>/all/</a:t>
+            </a:r>
+          </a:p>
+        </p:txBody>
+      </p:sp>
+      <p:sp>
+        <p:nvSpPr>
+          <p:cNvPr id="3" name="TextBox 2"/>
+          <p:cNvSpPr txBox="1"/>
+          <p:nvPr/>
+        </p:nvSpPr>
+        <p:spPr>
+          <a:xfrm>
+            <a:off x="4529137" y="3543300"/>
+            <a:ext cx="3868141" cy="738664"/>
+          </a:xfrm>
+          <a:prstGeom prst="rect">
+            <a:avLst/>
+          </a:prstGeom>
+          <a:noFill/>
+        </p:spPr>
+        <p:txBody>
+          <a:bodyPr wrap="none" rtlCol="0">
+            <a:spAutoFit/>
+          </a:bodyPr>
+          <a:lstStyle/>
+          <a:p>
+            <a:r>
+              <a:rPr lang="en-US" dirty="0" smtClean="0"/>
+              <a:t>But be careful….</a:t>
+            </a:r>
+            <a:endParaRPr lang="en-US" dirty="0"/>
+          </a:p>
+        </p:txBody>
+      </p:sp>
+    </p:spTree>
+    <p:extLst>
+      <p:ext uri="{BB962C8B-B14F-4D97-AF65-F5344CB8AC3E}">
+        <p14:creationId xmlns:p14="http://schemas.microsoft.com/office/powerpoint/2010/main" val="2938092286"/>
+      </p:ext>
+    </p:extLst>
+  </p:cSld>
+  <p:clrMapOvr>
+    <a:masterClrMapping/>
+  </p:clrMapOvr>
+  <p:transition xmlns:p14="http://schemas.microsoft.com/office/powerpoint/2010/main"/>
+</p:sld>
+</file>
+
+<file path=ppt/slides/slide18.xml><?xml version="1.0" encoding="utf-8"?>
+<p:sld xmlns:a="http://schemas.openxmlformats.org/drawingml/2006/main" xmlns:r="http://schemas.openxmlformats.org/officeDocument/2006/relationships" xmlns:p="http://schemas.openxmlformats.org/presentationml/2006/main">
+  <p:cSld>
+    <p:spTree>
+      <p:nvGrpSpPr>
+        <p:cNvPr id="1" name=""/>
+        <p:cNvGrpSpPr/>
+        <p:nvPr/>
+      </p:nvGrpSpPr>
+      <p:grpSpPr>
+        <a:xfrm>
+          <a:off x="0" y="0"/>
+          <a:ext cx="0" cy="0"/>
+          <a:chOff x="0" y="0"/>
+          <a:chExt cx="0" cy="0"/>
+        </a:xfrm>
+      </p:grpSpPr>
+      <p:sp>
+        <p:nvSpPr>
+          <p:cNvPr id="2" name="Title 1"/>
+          <p:cNvSpPr>
+            <a:spLocks noGrp="1"/>
+          </p:cNvSpPr>
+          <p:nvPr>
+            <p:ph type="title"/>
+          </p:nvPr>
+        </p:nvSpPr>
+        <p:spPr>
+          <a:xfrm>
             <a:off x="347663" y="3238500"/>
             <a:ext cx="8426450" cy="1828800"/>
           </a:xfrm>
@@ -10211,237 +10402,6 @@
 </p:sld>
 </file>
 
-<file path=ppt/slides/slide18.xml><?xml version="1.0" encoding="utf-8"?>
-<p:sld xmlns:a="http://schemas.openxmlformats.org/drawingml/2006/main" xmlns:r="http://schemas.openxmlformats.org/officeDocument/2006/relationships" xmlns:p="http://schemas.openxmlformats.org/presentationml/2006/main">
-  <p:cSld>
-    <p:spTree>
-      <p:nvGrpSpPr>
-        <p:cNvPr id="1" name=""/>
-        <p:cNvGrpSpPr/>
-        <p:nvPr/>
-      </p:nvGrpSpPr>
-      <p:grpSpPr>
-        <a:xfrm>
-          <a:off x="0" y="0"/>
-          <a:ext cx="0" cy="0"/>
-          <a:chOff x="0" y="0"/>
-          <a:chExt cx="0" cy="0"/>
-        </a:xfrm>
-      </p:grpSpPr>
-      <p:sp>
-        <p:nvSpPr>
-          <p:cNvPr id="4" name="Content Placeholder 3"/>
-          <p:cNvSpPr>
-            <a:spLocks noGrp="1"/>
-          </p:cNvSpPr>
-          <p:nvPr>
-            <p:ph sz="quarter" idx="11"/>
-          </p:nvPr>
-        </p:nvSpPr>
-        <p:spPr/>
-        <p:txBody>
-          <a:bodyPr/>
-          <a:lstStyle/>
-          <a:p>
-            <a:r>
-              <a:rPr lang="en-US" dirty="0" smtClean="0"/>
-              <a:t>API / Wrappers</a:t>
-            </a:r>
-            <a:endParaRPr lang="en-US" dirty="0"/>
-          </a:p>
-        </p:txBody>
-      </p:sp>
-      <p:sp>
-        <p:nvSpPr>
-          <p:cNvPr id="5" name="Slide Number Placeholder 4"/>
-          <p:cNvSpPr>
-            <a:spLocks noGrp="1"/>
-          </p:cNvSpPr>
-          <p:nvPr>
-            <p:ph type="sldNum" sz="quarter" idx="12"/>
-          </p:nvPr>
-        </p:nvSpPr>
-        <p:spPr/>
-        <p:txBody>
-          <a:bodyPr/>
-          <a:lstStyle/>
-          <a:p>
-            <a:pPr>
-              <a:defRPr/>
-            </a:pPr>
-            <a:fld id="{7D2F14C5-AF8B-6B42-A67C-58A084EA75B8}" type="slidenum">
-              <a:rPr lang="en-US" smtClean="0"/>
-              <a:pPr>
-                <a:defRPr/>
-              </a:pPr>
-              <a:t>18</a:t>
-            </a:fld>
-            <a:endParaRPr lang="en-US" dirty="0"/>
-          </a:p>
-        </p:txBody>
-      </p:sp>
-      <p:sp>
-        <p:nvSpPr>
-          <p:cNvPr id="2" name="TextBox 1"/>
-          <p:cNvSpPr txBox="1"/>
-          <p:nvPr/>
-        </p:nvSpPr>
-        <p:spPr>
-          <a:xfrm>
-            <a:off x="720473" y="1333500"/>
-            <a:ext cx="7344115" cy="738664"/>
-          </a:xfrm>
-          <a:prstGeom prst="rect">
-            <a:avLst/>
-          </a:prstGeom>
-          <a:noFill/>
-        </p:spPr>
-        <p:txBody>
-          <a:bodyPr wrap="none" rtlCol="0">
-            <a:spAutoFit/>
-          </a:bodyPr>
-          <a:lstStyle/>
-          <a:p>
-            <a:r>
-              <a:rPr lang="en-US" dirty="0" smtClean="0"/>
-              <a:t>HTML Parsing      vs.            API</a:t>
-            </a:r>
-            <a:endParaRPr lang="en-US" dirty="0"/>
-          </a:p>
-        </p:txBody>
-      </p:sp>
-      <p:sp>
-        <p:nvSpPr>
-          <p:cNvPr id="3" name="TextBox 2"/>
-          <p:cNvSpPr txBox="1"/>
-          <p:nvPr/>
-        </p:nvSpPr>
-        <p:spPr>
-          <a:xfrm>
-            <a:off x="490537" y="2400300"/>
-            <a:ext cx="3886200" cy="1246495"/>
-          </a:xfrm>
-          <a:prstGeom prst="rect">
-            <a:avLst/>
-          </a:prstGeom>
-          <a:noFill/>
-        </p:spPr>
-        <p:txBody>
-          <a:bodyPr wrap="square" rtlCol="0">
-            <a:spAutoFit/>
-          </a:bodyPr>
-          <a:lstStyle/>
-          <a:p>
-            <a:r>
-              <a:rPr lang="en-US" sz="2500" dirty="0" smtClean="0"/>
-              <a:t>Must call using requests and </a:t>
-            </a:r>
-            <a:r>
-              <a:rPr lang="en-US" sz="2500" dirty="0" err="1" smtClean="0"/>
-              <a:t>BeautifulSoup</a:t>
-            </a:r>
-            <a:r>
-              <a:rPr lang="en-US" sz="2500" dirty="0" smtClean="0"/>
-              <a:t> (imitate human behavior)</a:t>
-            </a:r>
-            <a:endParaRPr lang="en-US" sz="2500" dirty="0"/>
-          </a:p>
-        </p:txBody>
-      </p:sp>
-      <p:sp>
-        <p:nvSpPr>
-          <p:cNvPr id="8" name="TextBox 7"/>
-          <p:cNvSpPr txBox="1"/>
-          <p:nvPr/>
-        </p:nvSpPr>
-        <p:spPr>
-          <a:xfrm>
-            <a:off x="5291137" y="2324100"/>
-            <a:ext cx="3886200" cy="1246495"/>
-          </a:xfrm>
-          <a:prstGeom prst="rect">
-            <a:avLst/>
-          </a:prstGeom>
-          <a:noFill/>
-        </p:spPr>
-        <p:txBody>
-          <a:bodyPr wrap="square" rtlCol="0">
-            <a:spAutoFit/>
-          </a:bodyPr>
-          <a:lstStyle/>
-          <a:p>
-            <a:r>
-              <a:rPr lang="en-US" sz="2500" dirty="0" smtClean="0"/>
-              <a:t>Makes the call for us (the author is “allowing us” to access the data)</a:t>
-            </a:r>
-            <a:endParaRPr lang="en-US" sz="2500" dirty="0"/>
-          </a:p>
-        </p:txBody>
-      </p:sp>
-      <p:sp>
-        <p:nvSpPr>
-          <p:cNvPr id="6" name="TextBox 5"/>
-          <p:cNvSpPr txBox="1"/>
-          <p:nvPr/>
-        </p:nvSpPr>
-        <p:spPr>
-          <a:xfrm>
-            <a:off x="3110507" y="4686300"/>
-            <a:ext cx="6221725" cy="400110"/>
-          </a:xfrm>
-          <a:prstGeom prst="rect">
-            <a:avLst/>
-          </a:prstGeom>
-          <a:noFill/>
-        </p:spPr>
-        <p:txBody>
-          <a:bodyPr wrap="none" rtlCol="0">
-            <a:spAutoFit/>
-          </a:bodyPr>
-          <a:lstStyle/>
-          <a:p>
-            <a:r>
-              <a:rPr lang="en-US" sz="2000" dirty="0"/>
-              <a:t>http://</a:t>
-            </a:r>
-            <a:r>
-              <a:rPr lang="en-US" sz="2000" dirty="0" err="1"/>
-              <a:t>www.pythonforbeginners.com</a:t>
-            </a:r>
-            <a:r>
-              <a:rPr lang="en-US" sz="2000" dirty="0"/>
-              <a:t>/</a:t>
-            </a:r>
-            <a:r>
-              <a:rPr lang="en-US" sz="2000" dirty="0" err="1"/>
-              <a:t>api</a:t>
-            </a:r>
-            <a:r>
-              <a:rPr lang="en-US" sz="2000" dirty="0"/>
-              <a:t>/list-of-python-</a:t>
-            </a:r>
-            <a:r>
-              <a:rPr lang="en-US" sz="2000" dirty="0" err="1"/>
-              <a:t>apis</a:t>
-            </a:r>
-            <a:endParaRPr lang="en-US" sz="2000" dirty="0"/>
-          </a:p>
-        </p:txBody>
-      </p:sp>
-    </p:spTree>
-    <p:extLst>
-      <p:ext uri="{BB962C8B-B14F-4D97-AF65-F5344CB8AC3E}">
-        <p14:creationId xmlns:p14="http://schemas.microsoft.com/office/powerpoint/2010/main" val="512022508"/>
-      </p:ext>
-    </p:extLst>
-  </p:cSld>
-  <p:clrMapOvr>
-    <a:masterClrMapping/>
-  </p:clrMapOvr>
-  <p:transition xmlns:p14="http://schemas.microsoft.com/office/powerpoint/2010/main"/>
-</p:sld>
-</file>
-
 <file path=ppt/slides/slide19.xml><?xml version="1.0" encoding="utf-8"?>
 <p:sld xmlns:a="http://schemas.openxmlformats.org/drawingml/2006/main" xmlns:r="http://schemas.openxmlformats.org/officeDocument/2006/relationships" xmlns:p="http://schemas.openxmlformats.org/presentationml/2006/main">
   <p:cSld>
@@ -10513,14 +10473,14 @@
       </p:sp>
       <p:sp>
         <p:nvSpPr>
-          <p:cNvPr id="7" name="TextBox 6"/>
+          <p:cNvPr id="2" name="TextBox 1"/>
           <p:cNvSpPr txBox="1"/>
           <p:nvPr/>
         </p:nvSpPr>
         <p:spPr>
           <a:xfrm>
-            <a:off x="566737" y="1333500"/>
-            <a:ext cx="8066731" cy="2400657"/>
+            <a:off x="720473" y="1333500"/>
+            <a:ext cx="7344115" cy="738664"/>
           </a:xfrm>
           <a:prstGeom prst="rect">
             <a:avLst/>
@@ -10534,47 +10494,135 @@
           <a:lstStyle/>
           <a:p>
             <a:r>
-              <a:rPr lang="en-US" sz="4000" dirty="0" smtClean="0">
-                <a:latin typeface="News706 BT"/>
-                <a:cs typeface="News706 BT"/>
-              </a:rPr>
-              <a:t>API (n): </a:t>
-            </a:r>
-          </a:p>
-          <a:p>
-            <a:r>
-              <a:rPr lang="en-US" sz="4000" dirty="0" smtClean="0">
-                <a:latin typeface="News706 BT"/>
-                <a:cs typeface="News706 BT"/>
-              </a:rPr>
-              <a:t>Application Programming Interface</a:t>
-            </a:r>
-          </a:p>
-          <a:p>
-            <a:endParaRPr lang="en-US" sz="4000" dirty="0">
-              <a:latin typeface="News706 BT"/>
-              <a:cs typeface="News706 BT"/>
-            </a:endParaRPr>
-          </a:p>
-          <a:p>
-            <a:r>
-              <a:rPr lang="en-US" sz="3000" dirty="0" smtClean="0">
-                <a:latin typeface="News706 BT"/>
-                <a:cs typeface="News706 BT"/>
-              </a:rPr>
-              <a:t>Easing access into a web based software</a:t>
-            </a:r>
-            <a:endParaRPr lang="en-US" sz="3000" dirty="0">
-              <a:latin typeface="News706 BT"/>
-              <a:cs typeface="News706 BT"/>
-            </a:endParaRPr>
+              <a:rPr lang="en-US" dirty="0" smtClean="0"/>
+              <a:t>HTML Parsing      vs.            API</a:t>
+            </a:r>
+            <a:endParaRPr lang="en-US" dirty="0"/>
+          </a:p>
+        </p:txBody>
+      </p:sp>
+      <p:sp>
+        <p:nvSpPr>
+          <p:cNvPr id="3" name="TextBox 2"/>
+          <p:cNvSpPr txBox="1"/>
+          <p:nvPr/>
+        </p:nvSpPr>
+        <p:spPr>
+          <a:xfrm>
+            <a:off x="490537" y="2400300"/>
+            <a:ext cx="3886200" cy="1246495"/>
+          </a:xfrm>
+          <a:prstGeom prst="rect">
+            <a:avLst/>
+          </a:prstGeom>
+          <a:noFill/>
+        </p:spPr>
+        <p:txBody>
+          <a:bodyPr wrap="square" rtlCol="0">
+            <a:spAutoFit/>
+          </a:bodyPr>
+          <a:lstStyle/>
+          <a:p>
+            <a:r>
+              <a:rPr lang="en-US" sz="2500" dirty="0" smtClean="0"/>
+              <a:t>Must call using requests and </a:t>
+            </a:r>
+            <a:r>
+              <a:rPr lang="en-US" sz="2500" dirty="0" err="1" smtClean="0"/>
+              <a:t>BeautifulSoup</a:t>
+            </a:r>
+            <a:r>
+              <a:rPr lang="en-US" sz="2500" dirty="0" smtClean="0"/>
+              <a:t> (imitate human behavior)</a:t>
+            </a:r>
+            <a:endParaRPr lang="en-US" sz="2500" dirty="0"/>
+          </a:p>
+        </p:txBody>
+      </p:sp>
+      <p:sp>
+        <p:nvSpPr>
+          <p:cNvPr id="8" name="TextBox 7"/>
+          <p:cNvSpPr txBox="1"/>
+          <p:nvPr/>
+        </p:nvSpPr>
+        <p:spPr>
+          <a:xfrm>
+            <a:off x="5291137" y="2324100"/>
+            <a:ext cx="3886200" cy="1246495"/>
+          </a:xfrm>
+          <a:prstGeom prst="rect">
+            <a:avLst/>
+          </a:prstGeom>
+          <a:noFill/>
+        </p:spPr>
+        <p:txBody>
+          <a:bodyPr wrap="square" rtlCol="0">
+            <a:spAutoFit/>
+          </a:bodyPr>
+          <a:lstStyle/>
+          <a:p>
+            <a:r>
+              <a:rPr lang="en-US" sz="2500" dirty="0" smtClean="0"/>
+              <a:t>Makes the call for us (the author is “allowing us” to access the data)</a:t>
+            </a:r>
+            <a:endParaRPr lang="en-US" sz="2500" dirty="0"/>
+          </a:p>
+        </p:txBody>
+      </p:sp>
+      <p:sp>
+        <p:nvSpPr>
+          <p:cNvPr id="6" name="TextBox 5"/>
+          <p:cNvSpPr txBox="1"/>
+          <p:nvPr/>
+        </p:nvSpPr>
+        <p:spPr>
+          <a:xfrm>
+            <a:off x="3110507" y="4686300"/>
+            <a:ext cx="6221725" cy="400110"/>
+          </a:xfrm>
+          <a:prstGeom prst="rect">
+            <a:avLst/>
+          </a:prstGeom>
+          <a:noFill/>
+        </p:spPr>
+        <p:txBody>
+          <a:bodyPr wrap="none" rtlCol="0">
+            <a:spAutoFit/>
+          </a:bodyPr>
+          <a:lstStyle/>
+          <a:p>
+            <a:r>
+              <a:rPr lang="en-US" sz="2000" dirty="0"/>
+              <a:t>http://</a:t>
+            </a:r>
+            <a:r>
+              <a:rPr lang="en-US" sz="2000" dirty="0" err="1"/>
+              <a:t>www.pythonforbeginners.com</a:t>
+            </a:r>
+            <a:r>
+              <a:rPr lang="en-US" sz="2000" dirty="0"/>
+              <a:t>/</a:t>
+            </a:r>
+            <a:r>
+              <a:rPr lang="en-US" sz="2000" dirty="0" err="1"/>
+              <a:t>api</a:t>
+            </a:r>
+            <a:r>
+              <a:rPr lang="en-US" sz="2000" dirty="0"/>
+              <a:t>/list-of-python-</a:t>
+            </a:r>
+            <a:r>
+              <a:rPr lang="en-US" sz="2000" dirty="0" err="1"/>
+              <a:t>apis</a:t>
+            </a:r>
+            <a:endParaRPr lang="en-US" sz="2000" dirty="0"/>
           </a:p>
         </p:txBody>
       </p:sp>
     </p:spTree>
     <p:extLst>
       <p:ext uri="{BB962C8B-B14F-4D97-AF65-F5344CB8AC3E}">
-        <p14:creationId xmlns:p14="http://schemas.microsoft.com/office/powerpoint/2010/main" val="1479783256"/>
+        <p14:creationId xmlns:p14="http://schemas.microsoft.com/office/powerpoint/2010/main" val="512022508"/>
       </p:ext>
     </p:extLst>
   </p:cSld>
@@ -10929,8 +10977,8 @@
         </p:nvSpPr>
         <p:spPr>
           <a:xfrm>
-            <a:off x="2558522" y="1333500"/>
-            <a:ext cx="5109091" cy="3785652"/>
+            <a:off x="566737" y="1333500"/>
+            <a:ext cx="8066731" cy="2400657"/>
           </a:xfrm>
           <a:prstGeom prst="rect">
             <a:avLst/>
@@ -10943,104 +10991,48 @@
           </a:bodyPr>
           <a:lstStyle/>
           <a:p>
-            <a:pPr algn="l"/>
+            <a:r>
+              <a:rPr lang="en-US" sz="4000" dirty="0" smtClean="0">
+                <a:latin typeface="News706 BT"/>
+                <a:cs typeface="News706 BT"/>
+              </a:rPr>
+              <a:t>API (n): </a:t>
+            </a:r>
+          </a:p>
+          <a:p>
+            <a:r>
+              <a:rPr lang="en-US" sz="4000" dirty="0" smtClean="0">
+                <a:latin typeface="News706 BT"/>
+                <a:cs typeface="News706 BT"/>
+              </a:rPr>
+              <a:t>Application Programming Interface</a:t>
+            </a:r>
+          </a:p>
+          <a:p>
+            <a:endParaRPr lang="en-US" sz="4000" dirty="0">
+              <a:latin typeface="News706 BT"/>
+              <a:cs typeface="News706 BT"/>
+            </a:endParaRPr>
+          </a:p>
+          <a:p>
             <a:r>
               <a:rPr lang="en-US" sz="3000" dirty="0" smtClean="0">
                 <a:latin typeface="News706 BT"/>
                 <a:cs typeface="News706 BT"/>
               </a:rPr>
-              <a:t>Examples of API’s:</a:t>
-            </a:r>
-          </a:p>
-          <a:p>
-            <a:pPr algn="l"/>
+              <a:t>Easing access into a web based software</a:t>
+            </a:r>
             <a:endParaRPr lang="en-US" sz="3000" dirty="0">
               <a:latin typeface="News706 BT"/>
               <a:cs typeface="News706 BT"/>
             </a:endParaRPr>
           </a:p>
-          <a:p>
-            <a:pPr marL="457200" indent="-457200" algn="l">
-              <a:buFont typeface="Arial"/>
-              <a:buChar char="•"/>
-            </a:pPr>
-            <a:r>
-              <a:rPr lang="en-US" sz="3000" dirty="0" smtClean="0">
-                <a:latin typeface="News706 BT"/>
-                <a:cs typeface="News706 BT"/>
-              </a:rPr>
-              <a:t>Amazon (price data)</a:t>
-            </a:r>
-          </a:p>
-          <a:p>
-            <a:pPr marL="457200" indent="-457200" algn="l">
-              <a:buFont typeface="Arial"/>
-              <a:buChar char="•"/>
-            </a:pPr>
-            <a:r>
-              <a:rPr lang="en-US" sz="3000" dirty="0" smtClean="0">
-                <a:latin typeface="News706 BT"/>
-                <a:cs typeface="News706 BT"/>
-              </a:rPr>
-              <a:t>Twitter (tweets)</a:t>
-            </a:r>
-          </a:p>
-          <a:p>
-            <a:pPr marL="457200" indent="-457200" algn="l">
-              <a:buFont typeface="Arial"/>
-              <a:buChar char="•"/>
-            </a:pPr>
-            <a:r>
-              <a:rPr lang="en-US" sz="3000" dirty="0" smtClean="0">
-                <a:latin typeface="News706 BT"/>
-                <a:cs typeface="News706 BT"/>
-              </a:rPr>
-              <a:t>Facebook (social network)</a:t>
-            </a:r>
-          </a:p>
-          <a:p>
-            <a:pPr marL="457200" indent="-457200" algn="l">
-              <a:buFont typeface="Arial"/>
-              <a:buChar char="•"/>
-            </a:pPr>
-            <a:r>
-              <a:rPr lang="en-US" sz="3000" dirty="0" smtClean="0">
-                <a:latin typeface="News706 BT"/>
-                <a:cs typeface="News706 BT"/>
-              </a:rPr>
-              <a:t>Sentiment Analysis</a:t>
-            </a:r>
-            <a:endParaRPr lang="en-US" sz="3000" dirty="0">
-              <a:latin typeface="News706 BT"/>
-              <a:cs typeface="News706 BT"/>
-            </a:endParaRPr>
-          </a:p>
-          <a:p>
-            <a:pPr marL="457200" indent="-457200" algn="l">
-              <a:buFont typeface="Arial"/>
-              <a:buChar char="•"/>
-            </a:pPr>
-            <a:endParaRPr lang="en-US" sz="3000" dirty="0" smtClean="0">
-              <a:latin typeface="News706 BT"/>
-              <a:cs typeface="News706 BT"/>
-            </a:endParaRPr>
-          </a:p>
-          <a:p>
-            <a:pPr marL="457200" indent="-457200" algn="l">
-              <a:buFont typeface="Arial"/>
-              <a:buChar char="•"/>
-            </a:pPr>
-            <a:endParaRPr lang="en-US" sz="3000" dirty="0">
-              <a:latin typeface="News706 BT"/>
-              <a:cs typeface="News706 BT"/>
-            </a:endParaRPr>
-          </a:p>
         </p:txBody>
       </p:sp>
     </p:spTree>
     <p:extLst>
       <p:ext uri="{BB962C8B-B14F-4D97-AF65-F5344CB8AC3E}">
-        <p14:creationId xmlns:p14="http://schemas.microsoft.com/office/powerpoint/2010/main" val="2504117682"/>
+        <p14:creationId xmlns:p14="http://schemas.microsoft.com/office/powerpoint/2010/main" val="1479783256"/>
       </p:ext>
     </p:extLst>
   </p:cSld>
@@ -11236,74 +11228,10 @@
           </a:p>
         </p:txBody>
       </p:sp>
-      <p:sp>
-        <p:nvSpPr>
-          <p:cNvPr id="2" name="TextBox 1"/>
-          <p:cNvSpPr txBox="1"/>
-          <p:nvPr/>
-        </p:nvSpPr>
-        <p:spPr>
-          <a:xfrm>
-            <a:off x="414337" y="4533900"/>
-            <a:ext cx="7175388" cy="1015663"/>
-          </a:xfrm>
-          <a:prstGeom prst="rect">
-            <a:avLst/>
-          </a:prstGeom>
-          <a:noFill/>
-        </p:spPr>
-        <p:txBody>
-          <a:bodyPr wrap="square" rtlCol="0">
-            <a:spAutoFit/>
-          </a:bodyPr>
-          <a:lstStyle/>
-          <a:p>
-            <a:pPr algn="l"/>
-            <a:r>
-              <a:rPr lang="en-US" sz="2000" dirty="0" err="1">
-                <a:latin typeface="News706 BT"/>
-                <a:cs typeface="News706 BT"/>
-              </a:rPr>
-              <a:t>Mashape.com</a:t>
-            </a:r>
-            <a:r>
-              <a:rPr lang="en-US" sz="2000" dirty="0">
-                <a:latin typeface="News706 BT"/>
-                <a:cs typeface="News706 BT"/>
-              </a:rPr>
-              <a:t> has </a:t>
-            </a:r>
-            <a:r>
-              <a:rPr lang="en-US" sz="2000" dirty="0" smtClean="0">
-                <a:latin typeface="News706 BT"/>
-                <a:cs typeface="News706 BT"/>
-              </a:rPr>
-              <a:t>an </a:t>
-            </a:r>
-            <a:r>
-              <a:rPr lang="en-US" sz="2000" dirty="0">
-                <a:latin typeface="News706 BT"/>
-                <a:cs typeface="News706 BT"/>
-              </a:rPr>
-              <a:t>extensive collection</a:t>
-            </a:r>
-          </a:p>
-          <a:p>
-            <a:pPr algn="l"/>
-            <a:endParaRPr lang="en-US" sz="2000" dirty="0">
-              <a:latin typeface="News706 BT"/>
-              <a:cs typeface="News706 BT"/>
-            </a:endParaRPr>
-          </a:p>
-          <a:p>
-            <a:endParaRPr lang="en-US" sz="2000" dirty="0"/>
-          </a:p>
-        </p:txBody>
-      </p:sp>
     </p:spTree>
     <p:extLst>
       <p:ext uri="{BB962C8B-B14F-4D97-AF65-F5344CB8AC3E}">
-        <p14:creationId xmlns:p14="http://schemas.microsoft.com/office/powerpoint/2010/main" val="1848089181"/>
+        <p14:creationId xmlns:p14="http://schemas.microsoft.com/office/powerpoint/2010/main" val="2504117682"/>
       </p:ext>
     </p:extLst>
   </p:cSld>
@@ -11385,14 +11313,14 @@
       </p:sp>
       <p:sp>
         <p:nvSpPr>
-          <p:cNvPr id="2" name="TextBox 1"/>
+          <p:cNvPr id="7" name="TextBox 6"/>
           <p:cNvSpPr txBox="1"/>
           <p:nvPr/>
         </p:nvSpPr>
         <p:spPr>
           <a:xfrm>
-            <a:off x="587640" y="1333500"/>
-            <a:ext cx="7609776" cy="738664"/>
+            <a:off x="2558522" y="1333500"/>
+            <a:ext cx="5109091" cy="3785652"/>
           </a:xfrm>
           <a:prstGeom prst="rect">
             <a:avLst/>
@@ -11405,24 +11333,110 @@
           </a:bodyPr>
           <a:lstStyle/>
           <a:p>
-            <a:r>
-              <a:rPr lang="en-US" dirty="0" smtClean="0"/>
-              <a:t>API               vs.        API wrapper</a:t>
-            </a:r>
-            <a:endParaRPr lang="en-US" dirty="0"/>
-          </a:p>
-        </p:txBody>
-      </p:sp>
-      <p:sp>
-        <p:nvSpPr>
-          <p:cNvPr id="3" name="TextBox 2"/>
+            <a:pPr algn="l"/>
+            <a:r>
+              <a:rPr lang="en-US" sz="3000" dirty="0" smtClean="0">
+                <a:latin typeface="News706 BT"/>
+                <a:cs typeface="News706 BT"/>
+              </a:rPr>
+              <a:t>Examples of API’s:</a:t>
+            </a:r>
+          </a:p>
+          <a:p>
+            <a:pPr algn="l"/>
+            <a:endParaRPr lang="en-US" sz="3000" dirty="0">
+              <a:latin typeface="News706 BT"/>
+              <a:cs typeface="News706 BT"/>
+            </a:endParaRPr>
+          </a:p>
+          <a:p>
+            <a:pPr marL="457200" indent="-457200" algn="l">
+              <a:buFont typeface="Arial"/>
+              <a:buChar char="•"/>
+            </a:pPr>
+            <a:r>
+              <a:rPr lang="en-US" sz="3000" dirty="0" smtClean="0">
+                <a:latin typeface="News706 BT"/>
+                <a:cs typeface="News706 BT"/>
+              </a:rPr>
+              <a:t>Amazon (price data)</a:t>
+            </a:r>
+          </a:p>
+          <a:p>
+            <a:pPr marL="457200" indent="-457200" algn="l">
+              <a:buFont typeface="Arial"/>
+              <a:buChar char="•"/>
+            </a:pPr>
+            <a:r>
+              <a:rPr lang="en-US" sz="3000" dirty="0" smtClean="0">
+                <a:latin typeface="News706 BT"/>
+                <a:cs typeface="News706 BT"/>
+              </a:rPr>
+              <a:t>Twitter (tweets)</a:t>
+            </a:r>
+          </a:p>
+          <a:p>
+            <a:pPr marL="457200" indent="-457200" algn="l">
+              <a:buFont typeface="Arial"/>
+              <a:buChar char="•"/>
+            </a:pPr>
+            <a:r>
+              <a:rPr lang="en-US" sz="3000" dirty="0" smtClean="0">
+                <a:latin typeface="News706 BT"/>
+                <a:cs typeface="News706 BT"/>
+              </a:rPr>
+              <a:t>Facebook (social network)</a:t>
+            </a:r>
+          </a:p>
+          <a:p>
+            <a:pPr marL="457200" indent="-457200" algn="l">
+              <a:buFont typeface="Arial"/>
+              <a:buChar char="•"/>
+            </a:pPr>
+            <a:r>
+              <a:rPr lang="en-US" sz="3000" dirty="0" smtClean="0">
+                <a:latin typeface="News706 BT"/>
+                <a:cs typeface="News706 BT"/>
+              </a:rPr>
+              <a:t>Sentiment Analysis</a:t>
+            </a:r>
+            <a:endParaRPr lang="en-US" sz="3000" dirty="0">
+              <a:latin typeface="News706 BT"/>
+              <a:cs typeface="News706 BT"/>
+            </a:endParaRPr>
+          </a:p>
+          <a:p>
+            <a:pPr marL="457200" indent="-457200" algn="l">
+              <a:buFont typeface="Arial"/>
+              <a:buChar char="•"/>
+            </a:pPr>
+            <a:endParaRPr lang="en-US" sz="3000" dirty="0" smtClean="0">
+              <a:latin typeface="News706 BT"/>
+              <a:cs typeface="News706 BT"/>
+            </a:endParaRPr>
+          </a:p>
+          <a:p>
+            <a:pPr marL="457200" indent="-457200" algn="l">
+              <a:buFont typeface="Arial"/>
+              <a:buChar char="•"/>
+            </a:pPr>
+            <a:endParaRPr lang="en-US" sz="3000" dirty="0">
+              <a:latin typeface="News706 BT"/>
+              <a:cs typeface="News706 BT"/>
+            </a:endParaRPr>
+          </a:p>
+        </p:txBody>
+      </p:sp>
+      <p:sp>
+        <p:nvSpPr>
+          <p:cNvPr id="2" name="TextBox 1"/>
           <p:cNvSpPr txBox="1"/>
           <p:nvPr/>
         </p:nvSpPr>
         <p:spPr>
           <a:xfrm>
-            <a:off x="27566" y="2400300"/>
-            <a:ext cx="3886200" cy="861774"/>
+            <a:off x="414337" y="4533900"/>
+            <a:ext cx="7175388" cy="1015663"/>
           </a:xfrm>
           <a:prstGeom prst="rect">
             <a:avLst/>
@@ -11435,90 +11449,44 @@
           </a:bodyPr>
           <a:lstStyle/>
           <a:p>
-            <a:r>
-              <a:rPr lang="en-US" sz="2500" dirty="0" smtClean="0"/>
-              <a:t>May still be a bit confusing how to call the right page</a:t>
-            </a:r>
-            <a:endParaRPr lang="en-US" sz="2500" dirty="0"/>
-          </a:p>
-        </p:txBody>
-      </p:sp>
-      <p:sp>
-        <p:nvSpPr>
-          <p:cNvPr id="8" name="TextBox 7"/>
-          <p:cNvSpPr txBox="1"/>
-          <p:nvPr/>
-        </p:nvSpPr>
-        <p:spPr>
-          <a:xfrm>
-            <a:off x="4910137" y="2324100"/>
-            <a:ext cx="3886200" cy="1246495"/>
-          </a:xfrm>
-          <a:prstGeom prst="rect">
-            <a:avLst/>
-          </a:prstGeom>
-          <a:noFill/>
-        </p:spPr>
-        <p:txBody>
-          <a:bodyPr wrap="square" rtlCol="0">
-            <a:spAutoFit/>
-          </a:bodyPr>
-          <a:lstStyle/>
-          <a:p>
-            <a:r>
-              <a:rPr lang="en-US" sz="2500" dirty="0" smtClean="0"/>
-              <a:t>Puts the API into a specific programming language. Gives us python functions.</a:t>
-            </a:r>
-            <a:endParaRPr lang="en-US" sz="2500" dirty="0"/>
-          </a:p>
-        </p:txBody>
-      </p:sp>
-      <p:sp>
-        <p:nvSpPr>
-          <p:cNvPr id="6" name="TextBox 5"/>
-          <p:cNvSpPr txBox="1"/>
-          <p:nvPr/>
-        </p:nvSpPr>
-        <p:spPr>
-          <a:xfrm>
-            <a:off x="3110507" y="4686300"/>
-            <a:ext cx="6221725" cy="400110"/>
-          </a:xfrm>
-          <a:prstGeom prst="rect">
-            <a:avLst/>
-          </a:prstGeom>
-          <a:noFill/>
-        </p:spPr>
-        <p:txBody>
-          <a:bodyPr wrap="none" rtlCol="0">
-            <a:spAutoFit/>
-          </a:bodyPr>
-          <a:lstStyle/>
-          <a:p>
-            <a:r>
-              <a:rPr lang="en-US" sz="2000" dirty="0"/>
-              <a:t>http://</a:t>
-            </a:r>
-            <a:r>
-              <a:rPr lang="en-US" sz="2000" dirty="0" err="1"/>
-              <a:t>www.pythonforbeginners.com</a:t>
-            </a:r>
-            <a:r>
-              <a:rPr lang="en-US" sz="2000" dirty="0"/>
-              <a:t>/</a:t>
-            </a:r>
-            <a:r>
-              <a:rPr lang="en-US" sz="2000" dirty="0" err="1"/>
-              <a:t>api</a:t>
-            </a:r>
-            <a:r>
-              <a:rPr lang="en-US" sz="2000" dirty="0"/>
-              <a:t>/list-of-python-</a:t>
-            </a:r>
-            <a:r>
-              <a:rPr lang="en-US" sz="2000" dirty="0" err="1"/>
-              <a:t>apis</a:t>
-            </a:r>
+            <a:pPr algn="l"/>
+            <a:r>
+              <a:rPr lang="en-US" sz="2000" dirty="0" err="1">
+                <a:latin typeface="News706 BT"/>
+                <a:cs typeface="News706 BT"/>
+              </a:rPr>
+              <a:t>Mashape.com</a:t>
+            </a:r>
+            <a:r>
+              <a:rPr lang="en-US" sz="2000" dirty="0">
+                <a:latin typeface="News706 BT"/>
+                <a:cs typeface="News706 BT"/>
+              </a:rPr>
+              <a:t> has </a:t>
+            </a:r>
+            <a:r>
+              <a:rPr lang="en-US" sz="2000" dirty="0" smtClean="0">
+                <a:latin typeface="News706 BT"/>
+                <a:cs typeface="News706 BT"/>
+              </a:rPr>
+              <a:t>an </a:t>
+            </a:r>
+            <a:r>
+              <a:rPr lang="en-US" sz="2000" dirty="0">
+                <a:latin typeface="News706 BT"/>
+                <a:cs typeface="News706 BT"/>
+              </a:rPr>
+              <a:t>extensive collection</a:t>
+            </a:r>
+          </a:p>
+          <a:p>
+            <a:pPr algn="l"/>
+            <a:endParaRPr lang="en-US" sz="2000" dirty="0">
+              <a:latin typeface="News706 BT"/>
+              <a:cs typeface="News706 BT"/>
+            </a:endParaRPr>
+          </a:p>
+          <a:p>
             <a:endParaRPr lang="en-US" sz="2000" dirty="0"/>
           </a:p>
         </p:txBody>
@@ -11526,7 +11494,7 @@
     </p:spTree>
     <p:extLst>
       <p:ext uri="{BB962C8B-B14F-4D97-AF65-F5344CB8AC3E}">
-        <p14:creationId xmlns:p14="http://schemas.microsoft.com/office/powerpoint/2010/main" val="4036579270"/>
+        <p14:creationId xmlns:p14="http://schemas.microsoft.com/office/powerpoint/2010/main" val="1848089181"/>
       </p:ext>
     </p:extLst>
   </p:cSld>
@@ -11556,6 +11524,229 @@
       </p:grpSpPr>
       <p:sp>
         <p:nvSpPr>
+          <p:cNvPr id="4" name="Content Placeholder 3"/>
+          <p:cNvSpPr>
+            <a:spLocks noGrp="1"/>
+          </p:cNvSpPr>
+          <p:nvPr>
+            <p:ph sz="quarter" idx="11"/>
+          </p:nvPr>
+        </p:nvSpPr>
+        <p:spPr/>
+        <p:txBody>
+          <a:bodyPr/>
+          <a:lstStyle/>
+          <a:p>
+            <a:r>
+              <a:rPr lang="en-US" dirty="0" smtClean="0"/>
+              <a:t>API / Wrappers</a:t>
+            </a:r>
+            <a:endParaRPr lang="en-US" dirty="0"/>
+          </a:p>
+        </p:txBody>
+      </p:sp>
+      <p:sp>
+        <p:nvSpPr>
+          <p:cNvPr id="5" name="Slide Number Placeholder 4"/>
+          <p:cNvSpPr>
+            <a:spLocks noGrp="1"/>
+          </p:cNvSpPr>
+          <p:nvPr>
+            <p:ph type="sldNum" sz="quarter" idx="12"/>
+          </p:nvPr>
+        </p:nvSpPr>
+        <p:spPr/>
+        <p:txBody>
+          <a:bodyPr/>
+          <a:lstStyle/>
+          <a:p>
+            <a:pPr>
+              <a:defRPr/>
+            </a:pPr>
+            <a:fld id="{7D2F14C5-AF8B-6B42-A67C-58A084EA75B8}" type="slidenum">
+              <a:rPr lang="en-US" smtClean="0"/>
+              <a:pPr>
+                <a:defRPr/>
+              </a:pPr>
+              <a:t>23</a:t>
+            </a:fld>
+            <a:endParaRPr lang="en-US" dirty="0"/>
+          </a:p>
+        </p:txBody>
+      </p:sp>
+      <p:sp>
+        <p:nvSpPr>
+          <p:cNvPr id="2" name="TextBox 1"/>
+          <p:cNvSpPr txBox="1"/>
+          <p:nvPr/>
+        </p:nvSpPr>
+        <p:spPr>
+          <a:xfrm>
+            <a:off x="587640" y="1333500"/>
+            <a:ext cx="7609776" cy="738664"/>
+          </a:xfrm>
+          <a:prstGeom prst="rect">
+            <a:avLst/>
+          </a:prstGeom>
+          <a:noFill/>
+        </p:spPr>
+        <p:txBody>
+          <a:bodyPr wrap="none" rtlCol="0">
+            <a:spAutoFit/>
+          </a:bodyPr>
+          <a:lstStyle/>
+          <a:p>
+            <a:r>
+              <a:rPr lang="en-US" dirty="0" smtClean="0"/>
+              <a:t>API               vs.        API wrapper</a:t>
+            </a:r>
+            <a:endParaRPr lang="en-US" dirty="0"/>
+          </a:p>
+        </p:txBody>
+      </p:sp>
+      <p:sp>
+        <p:nvSpPr>
+          <p:cNvPr id="3" name="TextBox 2"/>
+          <p:cNvSpPr txBox="1"/>
+          <p:nvPr/>
+        </p:nvSpPr>
+        <p:spPr>
+          <a:xfrm>
+            <a:off x="27566" y="2400300"/>
+            <a:ext cx="3886200" cy="861774"/>
+          </a:xfrm>
+          <a:prstGeom prst="rect">
+            <a:avLst/>
+          </a:prstGeom>
+          <a:noFill/>
+        </p:spPr>
+        <p:txBody>
+          <a:bodyPr wrap="square" rtlCol="0">
+            <a:spAutoFit/>
+          </a:bodyPr>
+          <a:lstStyle/>
+          <a:p>
+            <a:r>
+              <a:rPr lang="en-US" sz="2500" dirty="0" smtClean="0"/>
+              <a:t>May still be a bit confusing how to call the right page</a:t>
+            </a:r>
+            <a:endParaRPr lang="en-US" sz="2500" dirty="0"/>
+          </a:p>
+        </p:txBody>
+      </p:sp>
+      <p:sp>
+        <p:nvSpPr>
+          <p:cNvPr id="8" name="TextBox 7"/>
+          <p:cNvSpPr txBox="1"/>
+          <p:nvPr/>
+        </p:nvSpPr>
+        <p:spPr>
+          <a:xfrm>
+            <a:off x="4910137" y="2324100"/>
+            <a:ext cx="3886200" cy="1246495"/>
+          </a:xfrm>
+          <a:prstGeom prst="rect">
+            <a:avLst/>
+          </a:prstGeom>
+          <a:noFill/>
+        </p:spPr>
+        <p:txBody>
+          <a:bodyPr wrap="square" rtlCol="0">
+            <a:spAutoFit/>
+          </a:bodyPr>
+          <a:lstStyle/>
+          <a:p>
+            <a:r>
+              <a:rPr lang="en-US" sz="2500" dirty="0" smtClean="0"/>
+              <a:t>Puts the API into a specific programming language. Gives us python functions.</a:t>
+            </a:r>
+            <a:endParaRPr lang="en-US" sz="2500" dirty="0"/>
+          </a:p>
+        </p:txBody>
+      </p:sp>
+      <p:sp>
+        <p:nvSpPr>
+          <p:cNvPr id="6" name="TextBox 5"/>
+          <p:cNvSpPr txBox="1"/>
+          <p:nvPr/>
+        </p:nvSpPr>
+        <p:spPr>
+          <a:xfrm>
+            <a:off x="3110507" y="4686300"/>
+            <a:ext cx="6221725" cy="400110"/>
+          </a:xfrm>
+          <a:prstGeom prst="rect">
+            <a:avLst/>
+          </a:prstGeom>
+          <a:noFill/>
+        </p:spPr>
+        <p:txBody>
+          <a:bodyPr wrap="none" rtlCol="0">
+            <a:spAutoFit/>
+          </a:bodyPr>
+          <a:lstStyle/>
+          <a:p>
+            <a:r>
+              <a:rPr lang="en-US" sz="2000" dirty="0"/>
+              <a:t>http://</a:t>
+            </a:r>
+            <a:r>
+              <a:rPr lang="en-US" sz="2000" dirty="0" err="1"/>
+              <a:t>www.pythonforbeginners.com</a:t>
+            </a:r>
+            <a:r>
+              <a:rPr lang="en-US" sz="2000" dirty="0"/>
+              <a:t>/</a:t>
+            </a:r>
+            <a:r>
+              <a:rPr lang="en-US" sz="2000" dirty="0" err="1"/>
+              <a:t>api</a:t>
+            </a:r>
+            <a:r>
+              <a:rPr lang="en-US" sz="2000" dirty="0"/>
+              <a:t>/list-of-python-</a:t>
+            </a:r>
+            <a:r>
+              <a:rPr lang="en-US" sz="2000" dirty="0" err="1"/>
+              <a:t>apis</a:t>
+            </a:r>
+            <a:endParaRPr lang="en-US" sz="2000" dirty="0"/>
+          </a:p>
+        </p:txBody>
+      </p:sp>
+    </p:spTree>
+    <p:extLst>
+      <p:ext uri="{BB962C8B-B14F-4D97-AF65-F5344CB8AC3E}">
+        <p14:creationId xmlns:p14="http://schemas.microsoft.com/office/powerpoint/2010/main" val="4036579270"/>
+      </p:ext>
+    </p:extLst>
+  </p:cSld>
+  <p:clrMapOvr>
+    <a:masterClrMapping/>
+  </p:clrMapOvr>
+  <p:transition xmlns:p14="http://schemas.microsoft.com/office/powerpoint/2010/main"/>
+</p:sld>
+</file>
+
+<file path=ppt/slides/slide24.xml><?xml version="1.0" encoding="utf-8"?>
+<p:sld xmlns:a="http://schemas.openxmlformats.org/drawingml/2006/main" xmlns:r="http://schemas.openxmlformats.org/officeDocument/2006/relationships" xmlns:p="http://schemas.openxmlformats.org/presentationml/2006/main">
+  <p:cSld>
+    <p:spTree>
+      <p:nvGrpSpPr>
+        <p:cNvPr id="1" name=""/>
+        <p:cNvGrpSpPr/>
+        <p:nvPr/>
+      </p:nvGrpSpPr>
+      <p:grpSpPr>
+        <a:xfrm>
+          <a:off x="0" y="0"/>
+          <a:ext cx="0" cy="0"/>
+          <a:chOff x="0" y="0"/>
+          <a:chExt cx="0" cy="0"/>
+        </a:xfrm>
+      </p:grpSpPr>
+      <p:sp>
+        <p:nvSpPr>
           <p:cNvPr id="2" name="Title 1"/>
           <p:cNvSpPr>
             <a:spLocks noGrp="1"/>
@@ -11647,179 +11838,6 @@
 </p:sld>
 </file>
 
-<file path=ppt/slides/slide24.xml><?xml version="1.0" encoding="utf-8"?>
-<p:sld xmlns:a="http://schemas.openxmlformats.org/drawingml/2006/main" xmlns:r="http://schemas.openxmlformats.org/officeDocument/2006/relationships" xmlns:p="http://schemas.openxmlformats.org/presentationml/2006/main">
-  <p:cSld>
-    <p:spTree>
-      <p:nvGrpSpPr>
-        <p:cNvPr id="1" name=""/>
-        <p:cNvGrpSpPr/>
-        <p:nvPr/>
-      </p:nvGrpSpPr>
-      <p:grpSpPr>
-        <a:xfrm>
-          <a:off x="0" y="0"/>
-          <a:ext cx="0" cy="0"/>
-          <a:chOff x="0" y="0"/>
-          <a:chExt cx="0" cy="0"/>
-        </a:xfrm>
-      </p:grpSpPr>
-      <p:sp>
-        <p:nvSpPr>
-          <p:cNvPr id="4" name="Content Placeholder 3"/>
-          <p:cNvSpPr>
-            <a:spLocks noGrp="1"/>
-          </p:cNvSpPr>
-          <p:nvPr>
-            <p:ph sz="quarter" idx="11"/>
-          </p:nvPr>
-        </p:nvSpPr>
-        <p:spPr/>
-        <p:txBody>
-          <a:bodyPr/>
-          <a:lstStyle/>
-          <a:p>
-            <a:r>
-              <a:rPr lang="en-US" dirty="0" smtClean="0"/>
-              <a:t>API / Wrappers</a:t>
-            </a:r>
-            <a:endParaRPr lang="en-US" dirty="0"/>
-          </a:p>
-        </p:txBody>
-      </p:sp>
-      <p:sp>
-        <p:nvSpPr>
-          <p:cNvPr id="5" name="Slide Number Placeholder 4"/>
-          <p:cNvSpPr>
-            <a:spLocks noGrp="1"/>
-          </p:cNvSpPr>
-          <p:nvPr>
-            <p:ph type="sldNum" sz="quarter" idx="12"/>
-          </p:nvPr>
-        </p:nvSpPr>
-        <p:spPr/>
-        <p:txBody>
-          <a:bodyPr/>
-          <a:lstStyle/>
-          <a:p>
-            <a:pPr>
-              <a:defRPr/>
-            </a:pPr>
-            <a:fld id="{7D2F14C5-AF8B-6B42-A67C-58A084EA75B8}" type="slidenum">
-              <a:rPr lang="en-US" smtClean="0"/>
-              <a:pPr>
-                <a:defRPr/>
-              </a:pPr>
-              <a:t>24</a:t>
-            </a:fld>
-            <a:endParaRPr lang="en-US" dirty="0"/>
-          </a:p>
-        </p:txBody>
-      </p:sp>
-      <p:sp>
-        <p:nvSpPr>
-          <p:cNvPr id="2" name="TextBox 1"/>
-          <p:cNvSpPr txBox="1"/>
-          <p:nvPr/>
-        </p:nvSpPr>
-        <p:spPr>
-          <a:xfrm>
-            <a:off x="667224" y="1409700"/>
-            <a:ext cx="7628235" cy="630942"/>
-          </a:xfrm>
-          <a:prstGeom prst="rect">
-            <a:avLst/>
-          </a:prstGeom>
-          <a:noFill/>
-        </p:spPr>
-        <p:txBody>
-          <a:bodyPr wrap="none" rtlCol="0">
-            <a:spAutoFit/>
-          </a:bodyPr>
-          <a:lstStyle/>
-          <a:p>
-            <a:r>
-              <a:rPr lang="en-US" sz="3500" dirty="0" smtClean="0"/>
-              <a:t>Facebook Experiment vs. Dunkin Donuts</a:t>
-            </a:r>
-            <a:endParaRPr lang="en-US" sz="3500" dirty="0"/>
-          </a:p>
-        </p:txBody>
-      </p:sp>
-      <p:sp>
-        <p:nvSpPr>
-          <p:cNvPr id="3" name="TextBox 2"/>
-          <p:cNvSpPr txBox="1"/>
-          <p:nvPr/>
-        </p:nvSpPr>
-        <p:spPr>
-          <a:xfrm>
-            <a:off x="676932" y="2314326"/>
-            <a:ext cx="3776006" cy="707886"/>
-          </a:xfrm>
-          <a:prstGeom prst="rect">
-            <a:avLst/>
-          </a:prstGeom>
-          <a:noFill/>
-        </p:spPr>
-        <p:txBody>
-          <a:bodyPr wrap="square" rtlCol="0">
-            <a:spAutoFit/>
-          </a:bodyPr>
-          <a:lstStyle/>
-          <a:p>
-            <a:r>
-              <a:rPr lang="en-US" sz="2000" dirty="0" smtClean="0"/>
-              <a:t>Facebook running psychological experiments on us</a:t>
-            </a:r>
-            <a:endParaRPr lang="en-US" sz="2000" dirty="0"/>
-          </a:p>
-        </p:txBody>
-      </p:sp>
-      <p:sp>
-        <p:nvSpPr>
-          <p:cNvPr id="6" name="TextBox 5"/>
-          <p:cNvSpPr txBox="1"/>
-          <p:nvPr/>
-        </p:nvSpPr>
-        <p:spPr>
-          <a:xfrm>
-            <a:off x="5367337" y="2324100"/>
-            <a:ext cx="3733800" cy="1246495"/>
-          </a:xfrm>
-          <a:prstGeom prst="rect">
-            <a:avLst/>
-          </a:prstGeom>
-          <a:noFill/>
-        </p:spPr>
-        <p:txBody>
-          <a:bodyPr wrap="square" rtlCol="0">
-            <a:spAutoFit/>
-          </a:bodyPr>
-          <a:lstStyle/>
-          <a:p>
-            <a:r>
-              <a:rPr lang="en-US" sz="2500" dirty="0" smtClean="0"/>
-              <a:t>Dunkin Donuts offering promos to areas with negative tweets</a:t>
-            </a:r>
-            <a:endParaRPr lang="en-US" sz="2500" dirty="0"/>
-          </a:p>
-        </p:txBody>
-      </p:sp>
-    </p:spTree>
-    <p:extLst>
-      <p:ext uri="{BB962C8B-B14F-4D97-AF65-F5344CB8AC3E}">
-        <p14:creationId xmlns:p14="http://schemas.microsoft.com/office/powerpoint/2010/main" val="473366548"/>
-      </p:ext>
-    </p:extLst>
-  </p:cSld>
-  <p:clrMapOvr>
-    <a:masterClrMapping/>
-  </p:clrMapOvr>
-  <p:transition xmlns:p14="http://schemas.microsoft.com/office/powerpoint/2010/main"/>
-</p:sld>
-</file>
-
 <file path=ppt/slides/slide25.xml><?xml version="1.0" encoding="utf-8"?>
 <p:sld xmlns:a="http://schemas.openxmlformats.org/drawingml/2006/main" xmlns:r="http://schemas.openxmlformats.org/officeDocument/2006/relationships" xmlns:p="http://schemas.openxmlformats.org/presentationml/2006/main">
   <p:cSld>
@@ -11884,6 +11902,179 @@
                 <a:defRPr/>
               </a:pPr>
               <a:t>25</a:t>
+            </a:fld>
+            <a:endParaRPr lang="en-US" dirty="0"/>
+          </a:p>
+        </p:txBody>
+      </p:sp>
+      <p:sp>
+        <p:nvSpPr>
+          <p:cNvPr id="2" name="TextBox 1"/>
+          <p:cNvSpPr txBox="1"/>
+          <p:nvPr/>
+        </p:nvSpPr>
+        <p:spPr>
+          <a:xfrm>
+            <a:off x="667224" y="1409700"/>
+            <a:ext cx="7628235" cy="630942"/>
+          </a:xfrm>
+          <a:prstGeom prst="rect">
+            <a:avLst/>
+          </a:prstGeom>
+          <a:noFill/>
+        </p:spPr>
+        <p:txBody>
+          <a:bodyPr wrap="none" rtlCol="0">
+            <a:spAutoFit/>
+          </a:bodyPr>
+          <a:lstStyle/>
+          <a:p>
+            <a:r>
+              <a:rPr lang="en-US" sz="3500" dirty="0" smtClean="0"/>
+              <a:t>Facebook Experiment vs. Dunkin Donuts</a:t>
+            </a:r>
+            <a:endParaRPr lang="en-US" sz="3500" dirty="0"/>
+          </a:p>
+        </p:txBody>
+      </p:sp>
+      <p:sp>
+        <p:nvSpPr>
+          <p:cNvPr id="3" name="TextBox 2"/>
+          <p:cNvSpPr txBox="1"/>
+          <p:nvPr/>
+        </p:nvSpPr>
+        <p:spPr>
+          <a:xfrm>
+            <a:off x="676932" y="2314326"/>
+            <a:ext cx="3776006" cy="707886"/>
+          </a:xfrm>
+          <a:prstGeom prst="rect">
+            <a:avLst/>
+          </a:prstGeom>
+          <a:noFill/>
+        </p:spPr>
+        <p:txBody>
+          <a:bodyPr wrap="square" rtlCol="0">
+            <a:spAutoFit/>
+          </a:bodyPr>
+          <a:lstStyle/>
+          <a:p>
+            <a:r>
+              <a:rPr lang="en-US" sz="2000" dirty="0" smtClean="0"/>
+              <a:t>Facebook running psychological experiments on us</a:t>
+            </a:r>
+            <a:endParaRPr lang="en-US" sz="2000" dirty="0"/>
+          </a:p>
+        </p:txBody>
+      </p:sp>
+      <p:sp>
+        <p:nvSpPr>
+          <p:cNvPr id="6" name="TextBox 5"/>
+          <p:cNvSpPr txBox="1"/>
+          <p:nvPr/>
+        </p:nvSpPr>
+        <p:spPr>
+          <a:xfrm>
+            <a:off x="5367337" y="2324100"/>
+            <a:ext cx="3733800" cy="1246495"/>
+          </a:xfrm>
+          <a:prstGeom prst="rect">
+            <a:avLst/>
+          </a:prstGeom>
+          <a:noFill/>
+        </p:spPr>
+        <p:txBody>
+          <a:bodyPr wrap="square" rtlCol="0">
+            <a:spAutoFit/>
+          </a:bodyPr>
+          <a:lstStyle/>
+          <a:p>
+            <a:r>
+              <a:rPr lang="en-US" sz="2500" dirty="0" smtClean="0"/>
+              <a:t>Dunkin Donuts offering promos to areas with negative tweets</a:t>
+            </a:r>
+            <a:endParaRPr lang="en-US" sz="2500" dirty="0"/>
+          </a:p>
+        </p:txBody>
+      </p:sp>
+    </p:spTree>
+    <p:extLst>
+      <p:ext uri="{BB962C8B-B14F-4D97-AF65-F5344CB8AC3E}">
+        <p14:creationId xmlns:p14="http://schemas.microsoft.com/office/powerpoint/2010/main" val="473366548"/>
+      </p:ext>
+    </p:extLst>
+  </p:cSld>
+  <p:clrMapOvr>
+    <a:masterClrMapping/>
+  </p:clrMapOvr>
+  <p:transition xmlns:p14="http://schemas.microsoft.com/office/powerpoint/2010/main"/>
+</p:sld>
+</file>
+
+<file path=ppt/slides/slide26.xml><?xml version="1.0" encoding="utf-8"?>
+<p:sld xmlns:a="http://schemas.openxmlformats.org/drawingml/2006/main" xmlns:r="http://schemas.openxmlformats.org/officeDocument/2006/relationships" xmlns:p="http://schemas.openxmlformats.org/presentationml/2006/main">
+  <p:cSld>
+    <p:spTree>
+      <p:nvGrpSpPr>
+        <p:cNvPr id="1" name=""/>
+        <p:cNvGrpSpPr/>
+        <p:nvPr/>
+      </p:nvGrpSpPr>
+      <p:grpSpPr>
+        <a:xfrm>
+          <a:off x="0" y="0"/>
+          <a:ext cx="0" cy="0"/>
+          <a:chOff x="0" y="0"/>
+          <a:chExt cx="0" cy="0"/>
+        </a:xfrm>
+      </p:grpSpPr>
+      <p:sp>
+        <p:nvSpPr>
+          <p:cNvPr id="4" name="Content Placeholder 3"/>
+          <p:cNvSpPr>
+            <a:spLocks noGrp="1"/>
+          </p:cNvSpPr>
+          <p:nvPr>
+            <p:ph sz="quarter" idx="11"/>
+          </p:nvPr>
+        </p:nvSpPr>
+        <p:spPr/>
+        <p:txBody>
+          <a:bodyPr/>
+          <a:lstStyle/>
+          <a:p>
+            <a:r>
+              <a:rPr lang="en-US" dirty="0" smtClean="0"/>
+              <a:t>API / Wrappers</a:t>
+            </a:r>
+            <a:endParaRPr lang="en-US" dirty="0"/>
+          </a:p>
+        </p:txBody>
+      </p:sp>
+      <p:sp>
+        <p:nvSpPr>
+          <p:cNvPr id="5" name="Slide Number Placeholder 4"/>
+          <p:cNvSpPr>
+            <a:spLocks noGrp="1"/>
+          </p:cNvSpPr>
+          <p:nvPr>
+            <p:ph type="sldNum" sz="quarter" idx="12"/>
+          </p:nvPr>
+        </p:nvSpPr>
+        <p:spPr/>
+        <p:txBody>
+          <a:bodyPr/>
+          <a:lstStyle/>
+          <a:p>
+            <a:pPr>
+              <a:defRPr/>
+            </a:pPr>
+            <a:fld id="{7D2F14C5-AF8B-6B42-A67C-58A084EA75B8}" type="slidenum">
+              <a:rPr lang="en-US" smtClean="0"/>
+              <a:pPr>
+                <a:defRPr/>
+              </a:pPr>
+              <a:t>26</a:t>
             </a:fld>
             <a:endParaRPr lang="en-US" dirty="0"/>
           </a:p>
@@ -12870,147 +13061,6 @@
       </p:grpSpPr>
       <p:sp>
         <p:nvSpPr>
-          <p:cNvPr id="2" name="Title 1"/>
-          <p:cNvSpPr>
-            <a:spLocks noGrp="1"/>
-          </p:cNvSpPr>
-          <p:nvPr>
-            <p:ph type="title"/>
-          </p:nvPr>
-        </p:nvSpPr>
-        <p:spPr/>
-        <p:txBody>
-          <a:bodyPr/>
-          <a:lstStyle/>
-          <a:p>
-            <a:endParaRPr lang="en-US"/>
-          </a:p>
-        </p:txBody>
-      </p:sp>
-      <p:sp>
-        <p:nvSpPr>
-          <p:cNvPr id="3" name="Content Placeholder 2"/>
-          <p:cNvSpPr>
-            <a:spLocks noGrp="1"/>
-          </p:cNvSpPr>
-          <p:nvPr>
-            <p:ph idx="1"/>
-          </p:nvPr>
-        </p:nvSpPr>
-        <p:spPr/>
-        <p:txBody>
-          <a:bodyPr/>
-          <a:lstStyle/>
-          <a:p>
-            <a:endParaRPr lang="en-US"/>
-          </a:p>
-        </p:txBody>
-      </p:sp>
-      <p:sp>
-        <p:nvSpPr>
-          <p:cNvPr id="4" name="Content Placeholder 3"/>
-          <p:cNvSpPr>
-            <a:spLocks noGrp="1"/>
-          </p:cNvSpPr>
-          <p:nvPr>
-            <p:ph sz="quarter" idx="11"/>
-          </p:nvPr>
-        </p:nvSpPr>
-        <p:spPr/>
-        <p:txBody>
-          <a:bodyPr/>
-          <a:lstStyle/>
-          <a:p>
-            <a:endParaRPr lang="en-US"/>
-          </a:p>
-        </p:txBody>
-      </p:sp>
-      <p:sp>
-        <p:nvSpPr>
-          <p:cNvPr id="5" name="Slide Number Placeholder 4"/>
-          <p:cNvSpPr>
-            <a:spLocks noGrp="1"/>
-          </p:cNvSpPr>
-          <p:nvPr>
-            <p:ph type="sldNum" sz="quarter" idx="12"/>
-          </p:nvPr>
-        </p:nvSpPr>
-        <p:spPr/>
-        <p:txBody>
-          <a:bodyPr/>
-          <a:lstStyle/>
-          <a:p>
-            <a:pPr>
-              <a:defRPr/>
-            </a:pPr>
-            <a:fld id="{7D2F14C5-AF8B-6B42-A67C-58A084EA75B8}" type="slidenum">
-              <a:rPr lang="en-US" smtClean="0"/>
-              <a:pPr>
-                <a:defRPr/>
-              </a:pPr>
-              <a:t>7</a:t>
-            </a:fld>
-            <a:endParaRPr lang="en-US" dirty="0"/>
-          </a:p>
-        </p:txBody>
-      </p:sp>
-      <p:pic>
-        <p:nvPicPr>
-          <p:cNvPr id="6" name="Picture 5"/>
-          <p:cNvPicPr>
-            <a:picLocks noChangeAspect="1"/>
-          </p:cNvPicPr>
-          <p:nvPr/>
-        </p:nvPicPr>
-        <p:blipFill>
-          <a:blip r:embed="rId2"/>
-          <a:stretch>
-            <a:fillRect/>
-          </a:stretch>
-        </p:blipFill>
-        <p:spPr>
-          <a:xfrm>
-            <a:off x="2082800" y="0"/>
-            <a:ext cx="5197166" cy="5257800"/>
-          </a:xfrm>
-          <a:prstGeom prst="rect">
-            <a:avLst/>
-          </a:prstGeom>
-        </p:spPr>
-      </p:pic>
-    </p:spTree>
-    <p:extLst>
-      <p:ext uri="{BB962C8B-B14F-4D97-AF65-F5344CB8AC3E}">
-        <p14:creationId xmlns:p14="http://schemas.microsoft.com/office/powerpoint/2010/main" val="1133534824"/>
-      </p:ext>
-    </p:extLst>
-  </p:cSld>
-  <p:clrMapOvr>
-    <a:masterClrMapping/>
-  </p:clrMapOvr>
-  <p:transition xmlns:p14="http://schemas.microsoft.com/office/powerpoint/2010/main"/>
-</p:sld>
-</file>
-
-<file path=ppt/slides/slide8.xml><?xml version="1.0" encoding="utf-8"?>
-<p:sld xmlns:a="http://schemas.openxmlformats.org/drawingml/2006/main" xmlns:r="http://schemas.openxmlformats.org/officeDocument/2006/relationships" xmlns:p="http://schemas.openxmlformats.org/presentationml/2006/main">
-  <p:cSld>
-    <p:spTree>
-      <p:nvGrpSpPr>
-        <p:cNvPr id="1" name=""/>
-        <p:cNvGrpSpPr/>
-        <p:nvPr/>
-      </p:nvGrpSpPr>
-      <p:grpSpPr>
-        <a:xfrm>
-          <a:off x="0" y="0"/>
-          <a:ext cx="0" cy="0"/>
-          <a:chOff x="0" y="0"/>
-          <a:chExt cx="0" cy="0"/>
-        </a:xfrm>
-      </p:grpSpPr>
-      <p:sp>
-        <p:nvSpPr>
           <p:cNvPr id="5" name="Slide Number Placeholder 3"/>
           <p:cNvSpPr>
             <a:spLocks noGrp="1"/>
@@ -13091,7 +13141,7 @@
                   <a:spcPts val="2304"/>
                 </a:lnSpc>
               </a:pPr>
-              <a:t>8</a:t>
+              <a:t>7</a:t>
             </a:fld>
             <a:endParaRPr lang="en-US" sz="2300" b="1" dirty="0">
               <a:solidFill>
@@ -13288,7 +13338,7 @@
 </p:sld>
 </file>
 
-<file path=ppt/slides/slide9.xml><?xml version="1.0" encoding="utf-8"?>
+<file path=ppt/slides/slide8.xml><?xml version="1.0" encoding="utf-8"?>
 <p:sld xmlns:a="http://schemas.openxmlformats.org/drawingml/2006/main" xmlns:r="http://schemas.openxmlformats.org/officeDocument/2006/relationships" xmlns:p="http://schemas.openxmlformats.org/presentationml/2006/main">
   <p:cSld>
     <p:spTree>
@@ -13387,7 +13437,7 @@
                   <a:spcPts val="2304"/>
                 </a:lnSpc>
               </a:pPr>
-              <a:t>9</a:t>
+              <a:t>8</a:t>
             </a:fld>
             <a:endParaRPr lang="en-US" sz="2300" b="1" dirty="0">
               <a:solidFill>
@@ -13603,6 +13653,116 @@
     <p:extLst>
       <p:ext uri="{BB962C8B-B14F-4D97-AF65-F5344CB8AC3E}">
         <p14:creationId xmlns:p14="http://schemas.microsoft.com/office/powerpoint/2010/main" val="2069045889"/>
+      </p:ext>
+    </p:extLst>
+  </p:cSld>
+  <p:clrMapOvr>
+    <a:masterClrMapping/>
+  </p:clrMapOvr>
+  <p:transition xmlns:p14="http://schemas.microsoft.com/office/powerpoint/2010/main"/>
+  <p:timing>
+    <p:tnLst>
+      <p:par>
+        <p:cTn xmlns:p14="http://schemas.microsoft.com/office/powerpoint/2010/main" id="1" dur="indefinite" restart="never" nodeType="tmRoot"/>
+      </p:par>
+    </p:tnLst>
+  </p:timing>
+</p:sld>
+</file>
+
+<file path=ppt/slides/slide9.xml><?xml version="1.0" encoding="utf-8"?>
+<p:sld xmlns:a="http://schemas.openxmlformats.org/drawingml/2006/main" xmlns:r="http://schemas.openxmlformats.org/officeDocument/2006/relationships" xmlns:p="http://schemas.openxmlformats.org/presentationml/2006/main">
+  <p:cSld>
+    <p:spTree>
+      <p:nvGrpSpPr>
+        <p:cNvPr id="1" name=""/>
+        <p:cNvGrpSpPr/>
+        <p:nvPr/>
+      </p:nvGrpSpPr>
+      <p:grpSpPr>
+        <a:xfrm>
+          <a:off x="0" y="0"/>
+          <a:ext cx="0" cy="0"/>
+          <a:chOff x="0" y="0"/>
+          <a:chExt cx="0" cy="0"/>
+        </a:xfrm>
+      </p:grpSpPr>
+      <p:sp>
+        <p:nvSpPr>
+          <p:cNvPr id="2" name="Title 1"/>
+          <p:cNvSpPr>
+            <a:spLocks noGrp="1"/>
+          </p:cNvSpPr>
+          <p:nvPr>
+            <p:ph type="title"/>
+          </p:nvPr>
+        </p:nvSpPr>
+        <p:spPr>
+          <a:xfrm>
+            <a:off x="347663" y="3924300"/>
+            <a:ext cx="8426450" cy="1143000"/>
+          </a:xfrm>
+        </p:spPr>
+        <p:txBody>
+          <a:bodyPr/>
+          <a:lstStyle/>
+          <a:p>
+            <a:pPr>
+              <a:defRPr/>
+            </a:pPr>
+            <a:r>
+              <a:rPr lang="en-US" sz="6600" dirty="0" smtClean="0"/>
+              <a:t>ii. REGEX / Requests</a:t>
+            </a:r>
+            <a:endParaRPr lang="en-US" sz="6600" dirty="0"/>
+          </a:p>
+        </p:txBody>
+      </p:sp>
+      <p:sp>
+        <p:nvSpPr>
+          <p:cNvPr id="4" name="Content Placeholder 3"/>
+          <p:cNvSpPr>
+            <a:spLocks noGrp="1"/>
+          </p:cNvSpPr>
+          <p:nvPr>
+            <p:ph sz="quarter" idx="11"/>
+          </p:nvPr>
+        </p:nvSpPr>
+        <p:spPr>
+          <a:xfrm>
+            <a:off x="371475" y="495300"/>
+            <a:ext cx="6400800" cy="304800"/>
+          </a:xfrm>
+        </p:spPr>
+        <p:txBody>
+          <a:bodyPr wrap="square" lIns="91440" tIns="45720" rIns="91440" bIns="45720" numCol="1" anchor="t" anchorCtr="0" compatLnSpc="1">
+            <a:prstTxWarp prst="textNoShape">
+              <a:avLst/>
+            </a:prstTxWarp>
+          </a:bodyPr>
+          <a:lstStyle/>
+          <a:p>
+            <a:pPr marL="0" indent="0"/>
+            <a:r>
+              <a:rPr lang="en-US" cap="none" dirty="0" smtClean="0">
+                <a:latin typeface="PFDinTextCompPro-Bold" charset="0"/>
+                <a:ea typeface="ヒラギノ角ゴ ProN W3" charset="0"/>
+                <a:cs typeface="ヒラギノ角ゴ ProN W3" charset="0"/>
+              </a:rPr>
+              <a:t>INTRO TO DATA SCIENCE</a:t>
+            </a:r>
+            <a:endParaRPr lang="en-US" cap="none" dirty="0">
+              <a:latin typeface="PFDinTextCompPro-Bold" charset="0"/>
+              <a:ea typeface="ヒラギノ角ゴ ProN W3" charset="0"/>
+              <a:cs typeface="ヒラギノ角ゴ ProN W3" charset="0"/>
+            </a:endParaRPr>
+          </a:p>
+        </p:txBody>
+      </p:sp>
+    </p:spTree>
+    <p:extLst>
+      <p:ext uri="{BB962C8B-B14F-4D97-AF65-F5344CB8AC3E}">
+        <p14:creationId xmlns:p14="http://schemas.microsoft.com/office/powerpoint/2010/main" val="3286295500"/>
       </p:ext>
     </p:extLst>
   </p:cSld>

</xml_diff>